<commit_message>
feat: add new image to explanation in `Aula 7`
</commit_message>
<xml_diff>
--- a/Aula 7/SelectJoin.pptx
+++ b/Aula 7/SelectJoin.pptx
@@ -111,6 +111,11 @@
       </a:defRPr>
     </a:lvl9pPr>
   </p:defaultTextStyle>
+  <p:extLst>
+    <p:ext uri="{EFAFB233-063F-42B5-8137-9DF3F51BA10A}">
+      <p15:sldGuideLst xmlns:p15="http://schemas.microsoft.com/office/powerpoint/2012/main"/>
+    </p:ext>
+  </p:extLst>
 </p:presentation>
 </file>
 
@@ -261,7 +266,7 @@
           <a:p>
             <a:fld id="{36132B91-77F1-458A-90AE-5579879FC726}" type="datetimeFigureOut">
               <a:rPr lang="pt-BR" smtClean="0"/>
-              <a:t>21/07/2025</a:t>
+              <a:t>25/01/2026</a:t>
             </a:fld>
             <a:endParaRPr lang="pt-BR"/>
           </a:p>
@@ -459,7 +464,7 @@
           <a:p>
             <a:fld id="{36132B91-77F1-458A-90AE-5579879FC726}" type="datetimeFigureOut">
               <a:rPr lang="pt-BR" smtClean="0"/>
-              <a:t>21/07/2025</a:t>
+              <a:t>25/01/2026</a:t>
             </a:fld>
             <a:endParaRPr lang="pt-BR"/>
           </a:p>
@@ -667,7 +672,7 @@
           <a:p>
             <a:fld id="{36132B91-77F1-458A-90AE-5579879FC726}" type="datetimeFigureOut">
               <a:rPr lang="pt-BR" smtClean="0"/>
-              <a:t>21/07/2025</a:t>
+              <a:t>25/01/2026</a:t>
             </a:fld>
             <a:endParaRPr lang="pt-BR"/>
           </a:p>
@@ -865,7 +870,7 @@
           <a:p>
             <a:fld id="{36132B91-77F1-458A-90AE-5579879FC726}" type="datetimeFigureOut">
               <a:rPr lang="pt-BR" smtClean="0"/>
-              <a:t>21/07/2025</a:t>
+              <a:t>25/01/2026</a:t>
             </a:fld>
             <a:endParaRPr lang="pt-BR"/>
           </a:p>
@@ -1140,7 +1145,7 @@
           <a:p>
             <a:fld id="{36132B91-77F1-458A-90AE-5579879FC726}" type="datetimeFigureOut">
               <a:rPr lang="pt-BR" smtClean="0"/>
-              <a:t>21/07/2025</a:t>
+              <a:t>25/01/2026</a:t>
             </a:fld>
             <a:endParaRPr lang="pt-BR"/>
           </a:p>
@@ -1405,7 +1410,7 @@
           <a:p>
             <a:fld id="{36132B91-77F1-458A-90AE-5579879FC726}" type="datetimeFigureOut">
               <a:rPr lang="pt-BR" smtClean="0"/>
-              <a:t>21/07/2025</a:t>
+              <a:t>25/01/2026</a:t>
             </a:fld>
             <a:endParaRPr lang="pt-BR"/>
           </a:p>
@@ -1817,7 +1822,7 @@
           <a:p>
             <a:fld id="{36132B91-77F1-458A-90AE-5579879FC726}" type="datetimeFigureOut">
               <a:rPr lang="pt-BR" smtClean="0"/>
-              <a:t>21/07/2025</a:t>
+              <a:t>25/01/2026</a:t>
             </a:fld>
             <a:endParaRPr lang="pt-BR"/>
           </a:p>
@@ -1958,7 +1963,7 @@
           <a:p>
             <a:fld id="{36132B91-77F1-458A-90AE-5579879FC726}" type="datetimeFigureOut">
               <a:rPr lang="pt-BR" smtClean="0"/>
-              <a:t>21/07/2025</a:t>
+              <a:t>25/01/2026</a:t>
             </a:fld>
             <a:endParaRPr lang="pt-BR"/>
           </a:p>
@@ -2071,7 +2076,7 @@
           <a:p>
             <a:fld id="{36132B91-77F1-458A-90AE-5579879FC726}" type="datetimeFigureOut">
               <a:rPr lang="pt-BR" smtClean="0"/>
-              <a:t>21/07/2025</a:t>
+              <a:t>25/01/2026</a:t>
             </a:fld>
             <a:endParaRPr lang="pt-BR"/>
           </a:p>
@@ -2382,7 +2387,7 @@
           <a:p>
             <a:fld id="{36132B91-77F1-458A-90AE-5579879FC726}" type="datetimeFigureOut">
               <a:rPr lang="pt-BR" smtClean="0"/>
-              <a:t>21/07/2025</a:t>
+              <a:t>25/01/2026</a:t>
             </a:fld>
             <a:endParaRPr lang="pt-BR"/>
           </a:p>
@@ -2670,7 +2675,7 @@
           <a:p>
             <a:fld id="{36132B91-77F1-458A-90AE-5579879FC726}" type="datetimeFigureOut">
               <a:rPr lang="pt-BR" smtClean="0"/>
-              <a:t>21/07/2025</a:t>
+              <a:t>25/01/2026</a:t>
             </a:fld>
             <a:endParaRPr lang="pt-BR"/>
           </a:p>
@@ -2911,7 +2916,7 @@
           <a:p>
             <a:fld id="{36132B91-77F1-458A-90AE-5579879FC726}" type="datetimeFigureOut">
               <a:rPr lang="pt-BR" smtClean="0"/>
-              <a:t>21/07/2025</a:t>
+              <a:t>25/01/2026</a:t>
             </a:fld>
             <a:endParaRPr lang="pt-BR"/>
           </a:p>
@@ -3749,6 +3754,7 @@
           </a:bodyPr>
           <a:lstStyle/>
           <a:p>
+            <a:pPr algn="ctr"/>
             <a:r>
               <a:rPr lang="en-US" sz="2000" dirty="0"/>
               <a:t>Quando </a:t>
@@ -3883,10 +3889,69 @@
       </p:sp>
       <p:pic>
         <p:nvPicPr>
-          <p:cNvPr id="1026" name="Picture 2" descr="Como Fazer um INNER JOIN, LEFT JOIN e RIGHT JOIN em SQL">
-            <a:extLst>
-              <a:ext uri="{FF2B5EF4-FFF2-40B4-BE49-F238E27FC236}">
-                <a16:creationId xmlns:a16="http://schemas.microsoft.com/office/drawing/2014/main" id="{98FA209B-1F46-F413-633A-15E650A39DA3}"/>
+          <p:cNvPr id="7" name="Imagem 6" descr="Desenho de personagem&#10;&#10;O conteúdo gerado por IA pode estar incorreto.">
+            <a:extLst>
+              <a:ext uri="{FF2B5EF4-FFF2-40B4-BE49-F238E27FC236}">
+                <a16:creationId xmlns:a16="http://schemas.microsoft.com/office/drawing/2014/main" id="{CDA2487C-C67F-1828-87F8-C3DCAFF0C0ED}"/>
+              </a:ext>
+            </a:extLst>
+          </p:cNvPr>
+          <p:cNvPicPr>
+            <a:picLocks noChangeAspect="1"/>
+          </p:cNvPicPr>
+          <p:nvPr/>
+        </p:nvPicPr>
+        <p:blipFill>
+          <a:blip r:embed="rId3"/>
+          <a:stretch>
+            <a:fillRect/>
+          </a:stretch>
+        </p:blipFill>
+        <p:spPr>
+          <a:xfrm>
+            <a:off x="6343216" y="2434923"/>
+            <a:ext cx="4233930" cy="4245311"/>
+          </a:xfrm>
+          <a:prstGeom prst="rect">
+            <a:avLst/>
+          </a:prstGeom>
+          <a:solidFill>
+            <a:srgbClr val="FFFFFF">
+              <a:shade val="85000"/>
+            </a:srgbClr>
+          </a:solidFill>
+          <a:ln w="190500" cap="rnd">
+            <a:solidFill>
+              <a:srgbClr val="FFFFFF"/>
+            </a:solidFill>
+          </a:ln>
+          <a:effectLst>
+            <a:outerShdw blurRad="50000" algn="tl" rotWithShape="0">
+              <a:srgbClr val="000000">
+                <a:alpha val="41000"/>
+              </a:srgbClr>
+            </a:outerShdw>
+          </a:effectLst>
+          <a:scene3d>
+            <a:camera prst="orthographicFront"/>
+            <a:lightRig rig="twoPt" dir="t">
+              <a:rot lat="0" lon="0" rev="7800000"/>
+            </a:lightRig>
+          </a:scene3d>
+          <a:sp3d contourW="6350">
+            <a:bevelT w="50800" h="16510"/>
+            <a:contourClr>
+              <a:srgbClr val="C0C0C0"/>
+            </a:contourClr>
+          </a:sp3d>
+        </p:spPr>
+      </p:pic>
+      <p:pic>
+        <p:nvPicPr>
+          <p:cNvPr id="1028" name="Picture 4" descr="Mastering FULL OUTER JOIN in SQL Server: A Complete Guide">
+            <a:extLst>
+              <a:ext uri="{FF2B5EF4-FFF2-40B4-BE49-F238E27FC236}">
+                <a16:creationId xmlns:a16="http://schemas.microsoft.com/office/drawing/2014/main" id="{E6DB2970-0FB4-B633-0AAA-3B0CABDC5A84}"/>
               </a:ext>
             </a:extLst>
           </p:cNvPr>
@@ -3896,7 +3961,7 @@
           <p:nvPr/>
         </p:nvPicPr>
         <p:blipFill>
-          <a:blip r:embed="rId3">
+          <a:blip r:embed="rId4">
             <a:extLst>
               <a:ext uri="{28A0092B-C50C-407E-A947-70E740481C1C}">
                 <a14:useLocalDpi xmlns:a14="http://schemas.microsoft.com/office/drawing/2010/main" val="0"/>
@@ -3910,8 +3975,8 @@
         </p:blipFill>
         <p:spPr bwMode="auto">
           <a:xfrm>
-            <a:off x="3484624" y="2308132"/>
-            <a:ext cx="5304814" cy="4243066"/>
+            <a:off x="427676" y="2313528"/>
+            <a:ext cx="5487865" cy="4390292"/>
           </a:xfrm>
           <a:prstGeom prst="rect">
             <a:avLst/>

</xml_diff>